<commit_message>
UI Design Template.pptx 수정 후 버전 업
</commit_message>
<xml_diff>
--- a/doc/3_ 설계서/UI Design Template.pptx
+++ b/doc/3_ 설계서/UI Design Template.pptx
@@ -2570,10 +2570,6 @@
                 </a:rPr>
                 <a:t>.</a:t>
               </a:r>
-              <a:endParaRPr lang="en-US" altLang="ko-KR" sz="1050" dirty="0" smtClean="0">
-                <a:latin typeface="맑은 고딕" pitchFamily="50" charset="-127"/>
-                <a:ea typeface="맑은 고딕" pitchFamily="50" charset="-127"/>
-              </a:endParaRPr>
             </a:p>
             <a:p>
               <a:pPr marL="171450" indent="-171450" algn="just">
@@ -2836,14 +2832,7 @@
                   <a:latin typeface="맑은 고딕" pitchFamily="50" charset="-127"/>
                   <a:ea typeface="맑은 고딕" pitchFamily="50" charset="-127"/>
                 </a:rPr>
-                <a:t> </a:t>
-              </a:r>
-              <a:r>
-                <a:rPr lang="ko-KR" altLang="en-US" sz="1050" dirty="0" smtClean="0">
-                  <a:latin typeface="맑은 고딕" pitchFamily="50" charset="-127"/>
-                  <a:ea typeface="맑은 고딕" pitchFamily="50" charset="-127"/>
-                </a:rPr>
-                <a:t>폰트 크기는 각각 </a:t>
+                <a:t> 폰트 크기는 각각 </a:t>
               </a:r>
               <a:r>
                 <a:rPr lang="en-US" altLang="ko-KR" sz="1050" dirty="0" smtClean="0">
@@ -3539,14 +3528,7 @@
                   <a:latin typeface="맑은 고딕" pitchFamily="50" charset="-127"/>
                   <a:ea typeface="맑은 고딕" pitchFamily="50" charset="-127"/>
                 </a:rPr>
-                <a:t>클릭된 날짜의 </a:t>
-              </a:r>
-              <a:r>
-                <a:rPr lang="ko-KR" altLang="en-US" sz="1050" dirty="0" smtClean="0">
-                  <a:latin typeface="맑은 고딕" pitchFamily="50" charset="-127"/>
-                  <a:ea typeface="맑은 고딕" pitchFamily="50" charset="-127"/>
-                </a:rPr>
-                <a:t>색상은 노란색으로 하며 배경 색은</a:t>
+                <a:t>클릭된 날짜의 색상은 노란색으로 하며 배경 색은</a:t>
               </a:r>
               <a:endParaRPr lang="en-US" altLang="ko-KR" sz="1050" dirty="0" smtClean="0">
                 <a:latin typeface="맑은 고딕" pitchFamily="50" charset="-127"/>
@@ -3588,14 +3570,7 @@
                   <a:latin typeface="맑은 고딕" pitchFamily="50" charset="-127"/>
                   <a:ea typeface="맑은 고딕" pitchFamily="50" charset="-127"/>
                 </a:rPr>
-                <a:t>으로 </a:t>
-              </a:r>
-              <a:r>
-                <a:rPr lang="ko-KR" altLang="en-US" sz="1050" dirty="0" smtClean="0">
-                  <a:latin typeface="맑은 고딕" pitchFamily="50" charset="-127"/>
-                  <a:ea typeface="맑은 고딕" pitchFamily="50" charset="-127"/>
-                </a:rPr>
-                <a:t>한다</a:t>
+                <a:t>으로 한다</a:t>
               </a:r>
               <a:r>
                 <a:rPr lang="en-US" altLang="ko-KR" sz="1050" dirty="0" smtClean="0">
@@ -6431,42 +6406,42 @@
                 <a:gridCol w="1024554">
                   <a:extLst>
                     <a:ext uri="{9D8B030D-6E8A-4147-A177-3AD203B41FA5}">
-                      <a16:colId xmlns:a16="http://schemas.microsoft.com/office/drawing/2014/main" xmlns="" val="20000"/>
+                      <a16:colId xmlns="" xmlns:a16="http://schemas.microsoft.com/office/drawing/2014/main" val="20000"/>
                     </a:ext>
                   </a:extLst>
                 </a:gridCol>
                 <a:gridCol w="2983884">
                   <a:extLst>
                     <a:ext uri="{9D8B030D-6E8A-4147-A177-3AD203B41FA5}">
-                      <a16:colId xmlns:a16="http://schemas.microsoft.com/office/drawing/2014/main" xmlns="" val="20001"/>
+                      <a16:colId xmlns="" xmlns:a16="http://schemas.microsoft.com/office/drawing/2014/main" val="20001"/>
                     </a:ext>
                   </a:extLst>
                 </a:gridCol>
                 <a:gridCol w="1196090">
                   <a:extLst>
                     <a:ext uri="{9D8B030D-6E8A-4147-A177-3AD203B41FA5}">
-                      <a16:colId xmlns:a16="http://schemas.microsoft.com/office/drawing/2014/main" xmlns="" val="20002"/>
+                      <a16:colId xmlns="" xmlns:a16="http://schemas.microsoft.com/office/drawing/2014/main" val="20002"/>
                     </a:ext>
                   </a:extLst>
                 </a:gridCol>
                 <a:gridCol w="1859283">
                   <a:extLst>
                     <a:ext uri="{9D8B030D-6E8A-4147-A177-3AD203B41FA5}">
-                      <a16:colId xmlns:a16="http://schemas.microsoft.com/office/drawing/2014/main" xmlns="" val="20003"/>
+                      <a16:colId xmlns="" xmlns:a16="http://schemas.microsoft.com/office/drawing/2014/main" val="20003"/>
                     </a:ext>
                   </a:extLst>
                 </a:gridCol>
                 <a:gridCol w="597313">
                   <a:extLst>
                     <a:ext uri="{9D8B030D-6E8A-4147-A177-3AD203B41FA5}">
-                      <a16:colId xmlns:a16="http://schemas.microsoft.com/office/drawing/2014/main" xmlns="" val="20004"/>
+                      <a16:colId xmlns="" xmlns:a16="http://schemas.microsoft.com/office/drawing/2014/main" val="20004"/>
                     </a:ext>
                   </a:extLst>
                 </a:gridCol>
                 <a:gridCol w="1272218">
                   <a:extLst>
                     <a:ext uri="{9D8B030D-6E8A-4147-A177-3AD203B41FA5}">
-                      <a16:colId xmlns:a16="http://schemas.microsoft.com/office/drawing/2014/main" xmlns="" val="20005"/>
+                      <a16:colId xmlns="" xmlns:a16="http://schemas.microsoft.com/office/drawing/2014/main" val="20005"/>
                     </a:ext>
                   </a:extLst>
                 </a:gridCol>
@@ -7059,7 +7034,7 @@
                 </a:tc>
                 <a:extLst>
                   <a:ext uri="{0D108BD9-81ED-4DB2-BD59-A6C34878D82A}">
-                    <a16:rowId xmlns:a16="http://schemas.microsoft.com/office/drawing/2014/main" xmlns="" val="10000"/>
+                    <a16:rowId xmlns="" xmlns:a16="http://schemas.microsoft.com/office/drawing/2014/main" val="10000"/>
                   </a:ext>
                 </a:extLst>
               </a:tr>
@@ -7617,7 +7592,7 @@
                 </a:tc>
                 <a:extLst>
                   <a:ext uri="{0D108BD9-81ED-4DB2-BD59-A6C34878D82A}">
-                    <a16:rowId xmlns:a16="http://schemas.microsoft.com/office/drawing/2014/main" xmlns="" val="10001"/>
+                    <a16:rowId xmlns="" xmlns:a16="http://schemas.microsoft.com/office/drawing/2014/main" val="10001"/>
                   </a:ext>
                 </a:extLst>
               </a:tr>
@@ -8141,7 +8116,7 @@
                 </a:tc>
                 <a:extLst>
                   <a:ext uri="{0D108BD9-81ED-4DB2-BD59-A6C34878D82A}">
-                    <a16:rowId xmlns:a16="http://schemas.microsoft.com/office/drawing/2014/main" xmlns="" val="10002"/>
+                    <a16:rowId xmlns="" xmlns:a16="http://schemas.microsoft.com/office/drawing/2014/main" val="10002"/>
                   </a:ext>
                 </a:extLst>
               </a:tr>
@@ -9128,42 +9103,42 @@
                 <a:gridCol w="1024554">
                   <a:extLst>
                     <a:ext uri="{9D8B030D-6E8A-4147-A177-3AD203B41FA5}">
-                      <a16:colId xmlns:a16="http://schemas.microsoft.com/office/drawing/2014/main" xmlns="" val="20000"/>
+                      <a16:colId xmlns="" xmlns:a16="http://schemas.microsoft.com/office/drawing/2014/main" val="20000"/>
                     </a:ext>
                   </a:extLst>
                 </a:gridCol>
                 <a:gridCol w="2983884">
                   <a:extLst>
                     <a:ext uri="{9D8B030D-6E8A-4147-A177-3AD203B41FA5}">
-                      <a16:colId xmlns:a16="http://schemas.microsoft.com/office/drawing/2014/main" xmlns="" val="20001"/>
+                      <a16:colId xmlns="" xmlns:a16="http://schemas.microsoft.com/office/drawing/2014/main" val="20001"/>
                     </a:ext>
                   </a:extLst>
                 </a:gridCol>
                 <a:gridCol w="1196090">
                   <a:extLst>
                     <a:ext uri="{9D8B030D-6E8A-4147-A177-3AD203B41FA5}">
-                      <a16:colId xmlns:a16="http://schemas.microsoft.com/office/drawing/2014/main" xmlns="" val="20002"/>
+                      <a16:colId xmlns="" xmlns:a16="http://schemas.microsoft.com/office/drawing/2014/main" val="20002"/>
                     </a:ext>
                   </a:extLst>
                 </a:gridCol>
                 <a:gridCol w="1859283">
                   <a:extLst>
                     <a:ext uri="{9D8B030D-6E8A-4147-A177-3AD203B41FA5}">
-                      <a16:colId xmlns:a16="http://schemas.microsoft.com/office/drawing/2014/main" xmlns="" val="20003"/>
+                      <a16:colId xmlns="" xmlns:a16="http://schemas.microsoft.com/office/drawing/2014/main" val="20003"/>
                     </a:ext>
                   </a:extLst>
                 </a:gridCol>
                 <a:gridCol w="597313">
                   <a:extLst>
                     <a:ext uri="{9D8B030D-6E8A-4147-A177-3AD203B41FA5}">
-                      <a16:colId xmlns:a16="http://schemas.microsoft.com/office/drawing/2014/main" xmlns="" val="20004"/>
+                      <a16:colId xmlns="" xmlns:a16="http://schemas.microsoft.com/office/drawing/2014/main" val="20004"/>
                     </a:ext>
                   </a:extLst>
                 </a:gridCol>
                 <a:gridCol w="1272218">
                   <a:extLst>
                     <a:ext uri="{9D8B030D-6E8A-4147-A177-3AD203B41FA5}">
-                      <a16:colId xmlns:a16="http://schemas.microsoft.com/office/drawing/2014/main" xmlns="" val="20005"/>
+                      <a16:colId xmlns="" xmlns:a16="http://schemas.microsoft.com/office/drawing/2014/main" val="20005"/>
                     </a:ext>
                   </a:extLst>
                 </a:gridCol>
@@ -9756,7 +9731,7 @@
                 </a:tc>
                 <a:extLst>
                   <a:ext uri="{0D108BD9-81ED-4DB2-BD59-A6C34878D82A}">
-                    <a16:rowId xmlns:a16="http://schemas.microsoft.com/office/drawing/2014/main" xmlns="" val="10000"/>
+                    <a16:rowId xmlns="" xmlns:a16="http://schemas.microsoft.com/office/drawing/2014/main" val="10000"/>
                   </a:ext>
                 </a:extLst>
               </a:tr>
@@ -10314,7 +10289,7 @@
                 </a:tc>
                 <a:extLst>
                   <a:ext uri="{0D108BD9-81ED-4DB2-BD59-A6C34878D82A}">
-                    <a16:rowId xmlns:a16="http://schemas.microsoft.com/office/drawing/2014/main" xmlns="" val="10001"/>
+                    <a16:rowId xmlns="" xmlns:a16="http://schemas.microsoft.com/office/drawing/2014/main" val="10001"/>
                   </a:ext>
                 </a:extLst>
               </a:tr>
@@ -10838,7 +10813,7 @@
                 </a:tc>
                 <a:extLst>
                   <a:ext uri="{0D108BD9-81ED-4DB2-BD59-A6C34878D82A}">
-                    <a16:rowId xmlns:a16="http://schemas.microsoft.com/office/drawing/2014/main" xmlns="" val="10002"/>
+                    <a16:rowId xmlns="" xmlns:a16="http://schemas.microsoft.com/office/drawing/2014/main" val="10002"/>
                   </a:ext>
                 </a:extLst>
               </a:tr>
@@ -18673,17 +18648,7 @@
                           <a:latin typeface="맑은 고딕" pitchFamily="50" charset="-127"/>
                           <a:ea typeface="맑은 고딕" pitchFamily="50" charset="-127"/>
                         </a:rPr>
-                        <a:t>검색할 단어 </a:t>
-                      </a:r>
-                      <a:r>
-                        <a:rPr lang="ko-KR" altLang="en-US" sz="1050" b="0" dirty="0" smtClean="0">
-                          <a:solidFill>
-                            <a:schemeClr val="tx1"/>
-                          </a:solidFill>
-                          <a:latin typeface="맑은 고딕" pitchFamily="50" charset="-127"/>
-                          <a:ea typeface="맑은 고딕" pitchFamily="50" charset="-127"/>
-                        </a:rPr>
-                        <a:t>입력</a:t>
+                        <a:t>검색할 단어 입력</a:t>
                       </a:r>
                       <a:endParaRPr lang="ko-KR" altLang="en-US" sz="1050" b="0" dirty="0">
                         <a:solidFill>
@@ -20503,17 +20468,7 @@
                           <a:latin typeface="맑은 고딕" pitchFamily="50" charset="-127"/>
                           <a:ea typeface="맑은 고딕" pitchFamily="50" charset="-127"/>
                         </a:rPr>
-                        <a:t>요구사항 </a:t>
-                      </a:r>
-                      <a:r>
-                        <a:rPr lang="ko-KR" altLang="en-US" sz="1200" b="0" dirty="0" smtClean="0">
-                          <a:solidFill>
-                            <a:schemeClr val="tx1"/>
-                          </a:solidFill>
-                          <a:latin typeface="맑은 고딕" pitchFamily="50" charset="-127"/>
-                          <a:ea typeface="맑은 고딕" pitchFamily="50" charset="-127"/>
-                        </a:rPr>
-                        <a:t>추가</a:t>
+                        <a:t>요구사항 추가</a:t>
                       </a:r>
                       <a:endParaRPr lang="ko-KR" altLang="en-US" sz="1200" b="0" dirty="0">
                         <a:solidFill>
@@ -20675,17 +20630,7 @@
                           <a:latin typeface="맑은 고딕" pitchFamily="50" charset="-127"/>
                           <a:ea typeface="맑은 고딕" pitchFamily="50" charset="-127"/>
                         </a:rPr>
-                        <a:t> </a:t>
-                      </a:r>
-                      <a:r>
-                        <a:rPr lang="ko-KR" altLang="en-US" sz="1200" b="0" baseline="0" dirty="0" smtClean="0">
-                          <a:solidFill>
-                            <a:schemeClr val="tx1"/>
-                          </a:solidFill>
-                          <a:latin typeface="맑은 고딕" pitchFamily="50" charset="-127"/>
-                          <a:ea typeface="맑은 고딕" pitchFamily="50" charset="-127"/>
-                        </a:rPr>
-                        <a:t>초안</a:t>
+                        <a:t> 초안</a:t>
                       </a:r>
                       <a:endParaRPr lang="ko-KR" altLang="en-US" sz="1200" b="0" dirty="0" smtClean="0">
                         <a:solidFill>
@@ -22482,10 +22427,6 @@
                 </a:rPr>
                 <a:t>.</a:t>
               </a:r>
-              <a:endParaRPr lang="en-US" altLang="ko-KR" sz="1050" dirty="0" smtClean="0">
-                <a:latin typeface="맑은 고딕" pitchFamily="50" charset="-127"/>
-                <a:ea typeface="맑은 고딕" pitchFamily="50" charset="-127"/>
-              </a:endParaRPr>
             </a:p>
             <a:p>
               <a:pPr algn="just">
@@ -22565,10 +22506,6 @@
                 </a:rPr>
                 <a:t>.</a:t>
               </a:r>
-              <a:endParaRPr lang="en-US" altLang="ko-KR" sz="1050" dirty="0" smtClean="0">
-                <a:latin typeface="맑은 고딕" pitchFamily="50" charset="-127"/>
-                <a:ea typeface="맑은 고딕" pitchFamily="50" charset="-127"/>
-              </a:endParaRPr>
             </a:p>
             <a:p>
               <a:pPr algn="just">
@@ -22681,14 +22618,7 @@
                   <a:latin typeface="맑은 고딕" pitchFamily="50" charset="-127"/>
                   <a:ea typeface="맑은 고딕" pitchFamily="50" charset="-127"/>
                 </a:rPr>
-                <a:t>을 버튼으로 </a:t>
-              </a:r>
-              <a:r>
-                <a:rPr lang="ko-KR" altLang="en-US" sz="1050" dirty="0" smtClean="0">
-                  <a:latin typeface="맑은 고딕" pitchFamily="50" charset="-127"/>
-                  <a:ea typeface="맑은 고딕" pitchFamily="50" charset="-127"/>
-                </a:rPr>
-                <a:t>한다</a:t>
+                <a:t>을 버튼으로 한다</a:t>
               </a:r>
               <a:r>
                 <a:rPr lang="en-US" altLang="ko-KR" sz="1050" dirty="0" smtClean="0">
@@ -26745,7 +26675,7 @@
           <p:nvPr>
             <p:extLst>
               <p:ext uri="{D42A27DB-BD31-4B8C-83A1-F6EECF244321}">
-                <p14:modId xmlns:p14="http://schemas.microsoft.com/office/powerpoint/2010/main" val="4192484417"/>
+                <p14:modId xmlns:p14="http://schemas.microsoft.com/office/powerpoint/2010/main" val="4034580374"/>
               </p:ext>
             </p:extLst>
           </p:nvPr>
@@ -27425,24 +27355,14 @@
                     <a:p>
                       <a:pPr latinLnBrk="1"/>
                       <a:r>
-                        <a:rPr lang="en-US" altLang="ko-KR" sz="1050" b="0" dirty="0" smtClean="0">
-                          <a:solidFill>
-                            <a:schemeClr val="tx1"/>
-                          </a:solidFill>
-                          <a:latin typeface="맑은 고딕" pitchFamily="50" charset="-127"/>
-                          <a:ea typeface="맑은 고딕" pitchFamily="50" charset="-127"/>
-                        </a:rPr>
-                        <a:t>Push</a:t>
-                      </a:r>
-                      <a:r>
-                        <a:rPr lang="en-US" altLang="ko-KR" sz="1050" b="0" baseline="0" dirty="0" smtClean="0">
-                          <a:solidFill>
-                            <a:schemeClr val="tx1"/>
-                          </a:solidFill>
-                          <a:latin typeface="맑은 고딕" pitchFamily="50" charset="-127"/>
-                          <a:ea typeface="맑은 고딕" pitchFamily="50" charset="-127"/>
-                        </a:rPr>
-                        <a:t> Button</a:t>
+                        <a:rPr lang="en-US" altLang="ko-KR" sz="1050" b="0" dirty="0" err="1" smtClean="0">
+                          <a:solidFill>
+                            <a:schemeClr val="tx1"/>
+                          </a:solidFill>
+                          <a:latin typeface="맑은 고딕" pitchFamily="50" charset="-127"/>
+                          <a:ea typeface="맑은 고딕" pitchFamily="50" charset="-127"/>
+                        </a:rPr>
+                        <a:t>JButton</a:t>
                       </a:r>
                       <a:endParaRPr lang="ko-KR" altLang="en-US" sz="1050" b="0" dirty="0">
                         <a:solidFill>
@@ -27577,14 +27497,14 @@
                     <a:p>
                       <a:pPr latinLnBrk="1"/>
                       <a:r>
-                        <a:rPr lang="en-US" altLang="ko-KR" sz="1050" b="0" dirty="0" smtClean="0">
-                          <a:solidFill>
-                            <a:schemeClr val="tx1"/>
-                          </a:solidFill>
-                          <a:latin typeface="맑은 고딕" pitchFamily="50" charset="-127"/>
-                          <a:ea typeface="맑은 고딕" pitchFamily="50" charset="-127"/>
-                        </a:rPr>
-                        <a:t>Push Button</a:t>
+                        <a:rPr lang="en-US" altLang="ko-KR" sz="1050" b="0" dirty="0" err="1" smtClean="0">
+                          <a:solidFill>
+                            <a:schemeClr val="tx1"/>
+                          </a:solidFill>
+                          <a:latin typeface="맑은 고딕" pitchFamily="50" charset="-127"/>
+                          <a:ea typeface="맑은 고딕" pitchFamily="50" charset="-127"/>
+                        </a:rPr>
+                        <a:t>JButton</a:t>
                       </a:r>
                       <a:endParaRPr lang="ko-KR" altLang="en-US" sz="1050" b="0" dirty="0">
                         <a:solidFill>
@@ -29220,13 +29140,6 @@
                 </a:rPr>
                 <a:t>.</a:t>
               </a:r>
-              <a:endParaRPr lang="en-US" altLang="ko-KR" sz="1050" dirty="0" smtClean="0">
-                <a:solidFill>
-                  <a:sysClr val="windowText" lastClr="000000"/>
-                </a:solidFill>
-                <a:latin typeface="맑은 고딕" pitchFamily="50" charset="-127"/>
-                <a:ea typeface="맑은 고딕" pitchFamily="50" charset="-127"/>
-              </a:endParaRPr>
             </a:p>
             <a:p>
               <a:pPr algn="just">
@@ -33301,7 +33214,7 @@
           <p:nvPr>
             <p:extLst>
               <p:ext uri="{D42A27DB-BD31-4B8C-83A1-F6EECF244321}">
-                <p14:modId xmlns:p14="http://schemas.microsoft.com/office/powerpoint/2010/main" val="1363044450"/>
+                <p14:modId xmlns:p14="http://schemas.microsoft.com/office/powerpoint/2010/main" val="1789438473"/>
               </p:ext>
             </p:extLst>
           </p:nvPr>
@@ -33981,24 +33894,14 @@
                     <a:p>
                       <a:pPr latinLnBrk="1"/>
                       <a:r>
-                        <a:rPr lang="en-US" altLang="ko-KR" sz="1050" b="0" dirty="0" smtClean="0">
-                          <a:solidFill>
-                            <a:schemeClr val="tx1"/>
-                          </a:solidFill>
-                          <a:latin typeface="맑은 고딕" pitchFamily="50" charset="-127"/>
-                          <a:ea typeface="맑은 고딕" pitchFamily="50" charset="-127"/>
-                        </a:rPr>
-                        <a:t>Push</a:t>
-                      </a:r>
-                      <a:r>
-                        <a:rPr lang="en-US" altLang="ko-KR" sz="1050" b="0" baseline="0" dirty="0" smtClean="0">
-                          <a:solidFill>
-                            <a:schemeClr val="tx1"/>
-                          </a:solidFill>
-                          <a:latin typeface="맑은 고딕" pitchFamily="50" charset="-127"/>
-                          <a:ea typeface="맑은 고딕" pitchFamily="50" charset="-127"/>
-                        </a:rPr>
-                        <a:t> Button</a:t>
+                        <a:rPr lang="en-US" altLang="ko-KR" sz="1050" b="0" dirty="0" err="1" smtClean="0">
+                          <a:solidFill>
+                            <a:schemeClr val="tx1"/>
+                          </a:solidFill>
+                          <a:latin typeface="맑은 고딕" pitchFamily="50" charset="-127"/>
+                          <a:ea typeface="맑은 고딕" pitchFamily="50" charset="-127"/>
+                        </a:rPr>
+                        <a:t>JButton</a:t>
                       </a:r>
                       <a:endParaRPr lang="ko-KR" altLang="en-US" sz="1050" b="0" dirty="0">
                         <a:solidFill>

</xml_diff>

<commit_message>
UI Design Template.pptx 수정 V0.6
</commit_message>
<xml_diff>
--- a/doc/3_ 설계서/UI Design Template.pptx
+++ b/doc/3_ 설계서/UI Design Template.pptx
@@ -4955,6 +4955,7 @@
                         <a:buFontTx/>
                         <a:buNone/>
                         <a:tabLst/>
+                        <a:defRPr/>
                       </a:pPr>
                       <a:r>
                         <a:rPr kumimoji="1" lang="en-US" altLang="ko-KR" sz="900" b="0" i="0" u="none" strike="noStrike" cap="none" normalizeH="0" baseline="0" dirty="0" smtClean="0">
@@ -4968,7 +4969,7 @@
                           <a:latin typeface="맑은 고딕" pitchFamily="50" charset="-127"/>
                           <a:ea typeface="맑은 고딕" pitchFamily="50" charset="-127"/>
                         </a:rPr>
-                        <a:t>UC001, UC002, UC003</a:t>
+                        <a:t>UC001, UC002, UC003, UC004, UC006, UC007, UC008, UC009, UC010, UC011, UC012, UC013, UC016, UC017, UC018, UC019, UC020</a:t>
                       </a:r>
                       <a:endParaRPr kumimoji="1" lang="ko-KR" altLang="ko-KR" sz="900" b="0" i="0" u="none" strike="noStrike" cap="none" normalizeH="0" baseline="0" dirty="0" smtClean="0">
                         <a:ln>
@@ -6389,7 +6390,7 @@
           <p:nvPr>
             <p:extLst>
               <p:ext uri="{D42A27DB-BD31-4B8C-83A1-F6EECF244321}">
-                <p14:modId xmlns:p14="http://schemas.microsoft.com/office/powerpoint/2010/main" val="2807585761"/>
+                <p14:modId xmlns:p14="http://schemas.microsoft.com/office/powerpoint/2010/main" val="3616528334"/>
               </p:ext>
             </p:extLst>
           </p:nvPr>
@@ -7729,7 +7730,7 @@
                           <a:latin typeface="맑은 고딕" pitchFamily="50" charset="-127"/>
                           <a:ea typeface="맑은 고딕" pitchFamily="50" charset="-127"/>
                         </a:rPr>
-                        <a:t>UC001, UC002, UC003</a:t>
+                        <a:t>UC002, UC003</a:t>
                       </a:r>
                       <a:endParaRPr kumimoji="1" lang="ko-KR" altLang="ko-KR" sz="900" b="0" i="0" u="none" strike="noStrike" cap="none" normalizeH="0" baseline="0" dirty="0" smtClean="0">
                         <a:ln>
@@ -9086,7 +9087,7 @@
           <p:nvPr>
             <p:extLst>
               <p:ext uri="{D42A27DB-BD31-4B8C-83A1-F6EECF244321}">
-                <p14:modId xmlns:p14="http://schemas.microsoft.com/office/powerpoint/2010/main" val="2640395425"/>
+                <p14:modId xmlns:p14="http://schemas.microsoft.com/office/powerpoint/2010/main" val="3931210000"/>
               </p:ext>
             </p:extLst>
           </p:nvPr>
@@ -10426,7 +10427,7 @@
                           <a:latin typeface="맑은 고딕" pitchFamily="50" charset="-127"/>
                           <a:ea typeface="맑은 고딕" pitchFamily="50" charset="-127"/>
                         </a:rPr>
-                        <a:t>UC001, UC002, UC003</a:t>
+                        <a:t>UC003, UC004, UC006, UC007, UC008, UC009, UC010, UC011, UC012, UC013, UC018</a:t>
                       </a:r>
                       <a:endParaRPr kumimoji="1" lang="ko-KR" altLang="ko-KR" sz="900" b="0" i="0" u="none" strike="noStrike" cap="none" normalizeH="0" baseline="0" dirty="0" smtClean="0">
                         <a:ln>
@@ -12210,7 +12211,7 @@
                           <a:latin typeface="맑은 고딕" pitchFamily="50" charset="-127"/>
                           <a:ea typeface="맑은 고딕" pitchFamily="50" charset="-127"/>
                         </a:rPr>
-                        <a:t>UC001, UC002, UC003</a:t>
+                        <a:t>UC001, UC002, UC003, UC004, UC006, UC007, UC008, UC009, UC010, UC011, UC012, UC013, UC016, UC017, UC018, UC019, UC020</a:t>
                       </a:r>
                       <a:endParaRPr kumimoji="1" lang="ko-KR" altLang="ko-KR" sz="900" b="0" i="0" u="none" strike="noStrike" cap="none" normalizeH="0" baseline="0" dirty="0" smtClean="0">
                         <a:ln>
@@ -14023,7 +14024,7 @@
                           <a:latin typeface="맑은 고딕" pitchFamily="50" charset="-127"/>
                           <a:ea typeface="맑은 고딕" pitchFamily="50" charset="-127"/>
                         </a:rPr>
-                        <a:t>UC001, UC002, UC003</a:t>
+                        <a:t>UC001, UC002, UC003, UC004, UC006, UC007, UC008, UC009, UC010, UC011, UC012, UC013, UC016, UC017, UC018, UC019, UC020</a:t>
                       </a:r>
                       <a:endParaRPr kumimoji="1" lang="ko-KR" altLang="ko-KR" sz="900" b="0" i="0" u="none" strike="noStrike" cap="none" normalizeH="0" baseline="0" dirty="0" smtClean="0">
                         <a:ln>
@@ -19880,14 +19881,14 @@
             <p:ph idx="1"/>
             <p:extLst>
               <p:ext uri="{D42A27DB-BD31-4B8C-83A1-F6EECF244321}">
-                <p14:modId xmlns:p14="http://schemas.microsoft.com/office/powerpoint/2010/main" val="3062369274"/>
+                <p14:modId xmlns:p14="http://schemas.microsoft.com/office/powerpoint/2010/main" val="1001319441"/>
               </p:ext>
             </p:extLst>
           </p:nvPr>
         </p:nvGraphicFramePr>
         <p:xfrm>
           <a:off x="280988" y="1025525"/>
-          <a:ext cx="8582024" cy="3495040"/>
+          <a:ext cx="8582024" cy="3860800"/>
         </p:xfrm>
         <a:graphic>
           <a:graphicData uri="http://schemas.openxmlformats.org/drawingml/2006/table">
@@ -20964,6 +20965,66 @@
                     <a:p>
                       <a:pPr latinLnBrk="1"/>
                       <a:r>
+                        <a:rPr lang="en-US" altLang="ko-KR" sz="1200" b="0" baseline="0" dirty="0" smtClean="0">
+                          <a:solidFill>
+                            <a:schemeClr val="tx1"/>
+                          </a:solidFill>
+                          <a:latin typeface="맑은 고딕" pitchFamily="50" charset="-127"/>
+                          <a:ea typeface="맑은 고딕" pitchFamily="50" charset="-127"/>
+                        </a:rPr>
+                        <a:t>SC003 </a:t>
+                      </a:r>
+                      <a:r>
+                        <a:rPr lang="ko-KR" altLang="en-US" sz="1200" b="0" baseline="0" dirty="0" smtClean="0">
+                          <a:solidFill>
+                            <a:schemeClr val="tx1"/>
+                          </a:solidFill>
+                          <a:latin typeface="맑은 고딕" pitchFamily="50" charset="-127"/>
+                          <a:ea typeface="맑은 고딕" pitchFamily="50" charset="-127"/>
+                        </a:rPr>
+                        <a:t>관련 </a:t>
+                      </a:r>
+                      <a:r>
+                        <a:rPr lang="en-US" altLang="ko-KR" sz="1200" b="0" baseline="0" dirty="0" err="1" smtClean="0">
+                          <a:solidFill>
+                            <a:schemeClr val="tx1"/>
+                          </a:solidFill>
+                          <a:latin typeface="맑은 고딕" pitchFamily="50" charset="-127"/>
+                          <a:ea typeface="맑은 고딕" pitchFamily="50" charset="-127"/>
+                        </a:rPr>
+                        <a:t>usecase</a:t>
+                      </a:r>
+                      <a:r>
+                        <a:rPr lang="en-US" altLang="ko-KR" sz="1200" b="0" baseline="0" smtClean="0">
+                          <a:solidFill>
+                            <a:schemeClr val="tx1"/>
+                          </a:solidFill>
+                          <a:latin typeface="맑은 고딕" pitchFamily="50" charset="-127"/>
+                          <a:ea typeface="맑은 고딕" pitchFamily="50" charset="-127"/>
+                        </a:rPr>
+                        <a:t> id </a:t>
+                      </a:r>
+                      <a:r>
+                        <a:rPr lang="ko-KR" altLang="en-US" sz="1200" b="0" baseline="0" smtClean="0">
+                          <a:solidFill>
+                            <a:schemeClr val="tx1"/>
+                          </a:solidFill>
+                          <a:latin typeface="맑은 고딕" pitchFamily="50" charset="-127"/>
+                          <a:ea typeface="맑은 고딕" pitchFamily="50" charset="-127"/>
+                        </a:rPr>
+                        <a:t>추가</a:t>
+                      </a:r>
+                      <a:endParaRPr lang="en-US" altLang="ko-KR" sz="1200" b="0" baseline="0" dirty="0" smtClean="0">
+                        <a:solidFill>
+                          <a:schemeClr val="tx1"/>
+                        </a:solidFill>
+                        <a:latin typeface="맑은 고딕" pitchFamily="50" charset="-127"/>
+                        <a:ea typeface="맑은 고딕" pitchFamily="50" charset="-127"/>
+                      </a:endParaRPr>
+                    </a:p>
+                    <a:p>
+                      <a:pPr latinLnBrk="1"/>
+                      <a:r>
                         <a:rPr lang="en-US" altLang="ko-KR" sz="1200" b="0" dirty="0" smtClean="0">
                           <a:solidFill>
                             <a:schemeClr val="tx1"/>
@@ -21001,8 +21062,31 @@
                           <a:latin typeface="맑은 고딕" pitchFamily="50" charset="-127"/>
                           <a:ea typeface="맑은 고딕" pitchFamily="50" charset="-127"/>
                         </a:rPr>
-                        <a:t>출력 정보일람 수정</a:t>
-                      </a:r>
+                        <a:t>출력 정보일람 </a:t>
+                      </a:r>
+                      <a:r>
+                        <a:rPr lang="ko-KR" altLang="en-US" sz="1200" b="0" dirty="0" smtClean="0">
+                          <a:solidFill>
+                            <a:schemeClr val="tx1"/>
+                          </a:solidFill>
+                          <a:latin typeface="맑은 고딕" pitchFamily="50" charset="-127"/>
+                          <a:ea typeface="맑은 고딕" pitchFamily="50" charset="-127"/>
+                        </a:rPr>
+                        <a:t>수정</a:t>
+                      </a:r>
+                      <a:r>
+                        <a:rPr lang="en-US" altLang="ko-KR" sz="1200" b="0" dirty="0" smtClean="0">
+                          <a:solidFill>
+                            <a:schemeClr val="tx1"/>
+                          </a:solidFill>
+                          <a:latin typeface="맑은 고딕" pitchFamily="50" charset="-127"/>
+                          <a:ea typeface="맑은 고딕" pitchFamily="50" charset="-127"/>
+                        </a:rPr>
+                        <a:t>,</a:t>
+                      </a:r>
+                    </a:p>
+                    <a:p>
+                      <a:pPr latinLnBrk="1"/>
                       <a:endParaRPr lang="ko-KR" altLang="en-US" sz="1200" b="0" dirty="0">
                         <a:solidFill>
                           <a:schemeClr val="tx1"/>
@@ -34920,7 +35004,7 @@
           <p:nvPr>
             <p:extLst>
               <p:ext uri="{D42A27DB-BD31-4B8C-83A1-F6EECF244321}">
-                <p14:modId xmlns:p14="http://schemas.microsoft.com/office/powerpoint/2010/main" val="432658695"/>
+                <p14:modId xmlns:p14="http://schemas.microsoft.com/office/powerpoint/2010/main" val="1652764771"/>
               </p:ext>
             </p:extLst>
           </p:nvPr>
@@ -36201,6 +36285,7 @@
                         <a:buFontTx/>
                         <a:buNone/>
                         <a:tabLst/>
+                        <a:defRPr/>
                       </a:pPr>
                       <a:r>
                         <a:rPr kumimoji="1" lang="en-US" altLang="ko-KR" sz="900" b="0" i="0" u="none" strike="noStrike" cap="none" normalizeH="0" baseline="0" dirty="0" smtClean="0">
@@ -36214,7 +36299,7 @@
                           <a:latin typeface="맑은 고딕" pitchFamily="50" charset="-127"/>
                           <a:ea typeface="맑은 고딕" pitchFamily="50" charset="-127"/>
                         </a:rPr>
-                        <a:t>UC001, UC002, UC003</a:t>
+                        <a:t>UC001, UC002, UC003, UC004, UC006, UC007, UC008, UC009, UC010, UC011, UC012, UC013, UC016, UC017, UC018, UC019, UC020</a:t>
                       </a:r>
                       <a:endParaRPr kumimoji="1" lang="ko-KR" altLang="ko-KR" sz="900" b="0" i="0" u="none" strike="noStrike" cap="none" normalizeH="0" baseline="0" dirty="0" smtClean="0">
                         <a:ln>

</xml_diff>